<commit_message>
updating assets and git ignore post presentation
</commit_message>
<xml_diff>
--- a/parts/stepbystep.pptx
+++ b/parts/stepbystep.pptx
@@ -5,16 +5,15 @@
     <p:sldMasterId id="2147483648" r:id="rId1"/>
   </p:sldMasterIdLst>
   <p:sldIdLst>
-    <p:sldId id="256" r:id="rId2"/>
-    <p:sldId id="265" r:id="rId3"/>
-    <p:sldId id="260" r:id="rId4"/>
-    <p:sldId id="261" r:id="rId5"/>
-    <p:sldId id="262" r:id="rId6"/>
-    <p:sldId id="263" r:id="rId7"/>
-    <p:sldId id="264" r:id="rId8"/>
-    <p:sldId id="257" r:id="rId9"/>
-    <p:sldId id="258" r:id="rId10"/>
-    <p:sldId id="259" r:id="rId11"/>
+    <p:sldId id="265" r:id="rId2"/>
+    <p:sldId id="260" r:id="rId3"/>
+    <p:sldId id="261" r:id="rId4"/>
+    <p:sldId id="262" r:id="rId5"/>
+    <p:sldId id="263" r:id="rId6"/>
+    <p:sldId id="264" r:id="rId7"/>
+    <p:sldId id="257" r:id="rId8"/>
+    <p:sldId id="258" r:id="rId9"/>
+    <p:sldId id="259" r:id="rId10"/>
   </p:sldIdLst>
   <p:sldSz cx="12192000" cy="6858000"/>
   <p:notesSz cx="6858000" cy="9144000"/>
@@ -3337,340 +3336,118 @@
       </p:grpSpPr>
       <p:sp>
         <p:nvSpPr>
-          <p:cNvPr id="4" name="Rectangle 3">
-            <a:extLst>
-              <a:ext uri="{FF2B5EF4-FFF2-40B4-BE49-F238E27FC236}">
-                <a16:creationId xmlns:a16="http://schemas.microsoft.com/office/drawing/2014/main" id="{56EDF921-0D99-427D-8C4F-F8C7663F2459}"/>
-              </a:ext>
-            </a:extLst>
-          </p:cNvPr>
-          <p:cNvSpPr/>
-          <p:nvPr/>
-        </p:nvSpPr>
-        <p:spPr>
-          <a:xfrm>
-            <a:off x="757020" y="610191"/>
-            <a:ext cx="3698320" cy="369332"/>
-          </a:xfrm>
-          <a:prstGeom prst="rect">
-            <a:avLst/>
-          </a:prstGeom>
-        </p:spPr>
-        <p:txBody>
-          <a:bodyPr wrap="none">
-            <a:spAutoFit/>
-          </a:bodyPr>
-          <a:lstStyle/>
-          <a:p>
-            <a:r>
-              <a:rPr lang="en-US" dirty="0"/>
-              <a:t>dotnet new angular  -f netcoreapp2.1</a:t>
-            </a:r>
-          </a:p>
-        </p:txBody>
-      </p:sp>
-      <p:pic>
-        <p:nvPicPr>
-          <p:cNvPr id="5" name="Picture 4">
-            <a:extLst>
-              <a:ext uri="{FF2B5EF4-FFF2-40B4-BE49-F238E27FC236}">
-                <a16:creationId xmlns:a16="http://schemas.microsoft.com/office/drawing/2014/main" id="{1989BC4D-1A44-4B7D-91DC-25B1B4B4256C}"/>
-              </a:ext>
-            </a:extLst>
-          </p:cNvPr>
-          <p:cNvPicPr>
-            <a:picLocks noChangeAspect="1"/>
-          </p:cNvPicPr>
-          <p:nvPr/>
-        </p:nvPicPr>
-        <p:blipFill>
-          <a:blip r:embed="rId2"/>
-          <a:stretch>
-            <a:fillRect/>
-          </a:stretch>
-        </p:blipFill>
-        <p:spPr>
-          <a:xfrm>
-            <a:off x="757020" y="1095462"/>
-            <a:ext cx="7038975" cy="2133600"/>
-          </a:xfrm>
-          <a:prstGeom prst="rect">
-            <a:avLst/>
-          </a:prstGeom>
-        </p:spPr>
-      </p:pic>
-      <p:pic>
-        <p:nvPicPr>
-          <p:cNvPr id="6" name="Picture 5">
-            <a:extLst>
-              <a:ext uri="{FF2B5EF4-FFF2-40B4-BE49-F238E27FC236}">
-                <a16:creationId xmlns:a16="http://schemas.microsoft.com/office/drawing/2014/main" id="{28B8EE6D-403F-44D5-B32C-2D3EBD9B10A1}"/>
-              </a:ext>
-            </a:extLst>
-          </p:cNvPr>
-          <p:cNvPicPr>
-            <a:picLocks noChangeAspect="1"/>
-          </p:cNvPicPr>
-          <p:nvPr/>
-        </p:nvPicPr>
-        <p:blipFill>
-          <a:blip r:embed="rId3"/>
-          <a:stretch>
-            <a:fillRect/>
-          </a:stretch>
-        </p:blipFill>
-        <p:spPr>
-          <a:xfrm>
-            <a:off x="975700" y="3757394"/>
-            <a:ext cx="6029325" cy="1104900"/>
-          </a:xfrm>
-          <a:prstGeom prst="rect">
-            <a:avLst/>
-          </a:prstGeom>
-        </p:spPr>
-      </p:pic>
-      <p:pic>
-        <p:nvPicPr>
-          <p:cNvPr id="7" name="Picture 6">
-            <a:extLst>
-              <a:ext uri="{FF2B5EF4-FFF2-40B4-BE49-F238E27FC236}">
-                <a16:creationId xmlns:a16="http://schemas.microsoft.com/office/drawing/2014/main" id="{F8779204-6519-4984-B128-4D26A0CC4E3E}"/>
-              </a:ext>
-            </a:extLst>
-          </p:cNvPr>
-          <p:cNvPicPr>
-            <a:picLocks noChangeAspect="1"/>
-          </p:cNvPicPr>
-          <p:nvPr/>
-        </p:nvPicPr>
-        <p:blipFill>
-          <a:blip r:embed="rId4"/>
-          <a:stretch>
-            <a:fillRect/>
-          </a:stretch>
-        </p:blipFill>
-        <p:spPr>
-          <a:xfrm>
-            <a:off x="975700" y="5027233"/>
-            <a:ext cx="3705225" cy="1685925"/>
-          </a:xfrm>
-          <a:prstGeom prst="rect">
-            <a:avLst/>
-          </a:prstGeom>
-        </p:spPr>
-      </p:pic>
-      <p:sp>
-        <p:nvSpPr>
-          <p:cNvPr id="8" name="TextBox 7">
-            <a:extLst>
-              <a:ext uri="{FF2B5EF4-FFF2-40B4-BE49-F238E27FC236}">
-                <a16:creationId xmlns:a16="http://schemas.microsoft.com/office/drawing/2014/main" id="{D4D86B9D-1BF9-4675-A2E1-3BAAC7AE9A2A}"/>
-              </a:ext>
-            </a:extLst>
-          </p:cNvPr>
-          <p:cNvSpPr txBox="1"/>
-          <p:nvPr/>
-        </p:nvSpPr>
-        <p:spPr>
-          <a:xfrm>
-            <a:off x="7935985" y="3757394"/>
-            <a:ext cx="1954635" cy="646331"/>
-          </a:xfrm>
-          <a:prstGeom prst="rect">
-            <a:avLst/>
-          </a:prstGeom>
-          <a:noFill/>
-        </p:spPr>
-        <p:txBody>
-          <a:bodyPr wrap="square" rtlCol="0">
-            <a:spAutoFit/>
-          </a:bodyPr>
-          <a:lstStyle/>
-          <a:p>
-            <a:r>
-              <a:rPr lang="en-US" dirty="0"/>
-              <a:t>F5-&gt;select .NET Core-&gt;f5</a:t>
-            </a:r>
+          <p:cNvPr id="2" name="Title 1">
+            <a:extLst>
+              <a:ext uri="{FF2B5EF4-FFF2-40B4-BE49-F238E27FC236}">
+                <a16:creationId xmlns:a16="http://schemas.microsoft.com/office/drawing/2014/main" id="{17C1B3BC-BE02-4F43-9268-91544E3188E4}"/>
+              </a:ext>
+            </a:extLst>
+          </p:cNvPr>
+          <p:cNvSpPr>
+            <a:spLocks noGrp="1"/>
+          </p:cNvSpPr>
+          <p:nvPr>
+            <p:ph type="title"/>
+          </p:nvPr>
+        </p:nvSpPr>
+        <p:spPr/>
+        <p:txBody>
+          <a:bodyPr/>
+          <a:lstStyle/>
+          <a:p>
+            <a:r>
+              <a:rPr lang="en-US" dirty="0"/>
+              <a:t>0. It’s easy to get stated</a:t>
+            </a:r>
+          </a:p>
+        </p:txBody>
+      </p:sp>
+      <p:sp>
+        <p:nvSpPr>
+          <p:cNvPr id="3" name="Content Placeholder 2">
+            <a:extLst>
+              <a:ext uri="{FF2B5EF4-FFF2-40B4-BE49-F238E27FC236}">
+                <a16:creationId xmlns:a16="http://schemas.microsoft.com/office/drawing/2014/main" id="{BC72CAF8-7C43-4BDC-AC92-3964F5B0CC15}"/>
+              </a:ext>
+            </a:extLst>
+          </p:cNvPr>
+          <p:cNvSpPr>
+            <a:spLocks noGrp="1"/>
+          </p:cNvSpPr>
+          <p:nvPr>
+            <p:ph idx="1"/>
+          </p:nvPr>
+        </p:nvSpPr>
+        <p:spPr/>
+        <p:txBody>
+          <a:bodyPr/>
+          <a:lstStyle/>
+          <a:p>
+            <a:r>
+              <a:rPr lang="en-US" dirty="0"/>
+              <a:t>“download” elastic</a:t>
+            </a:r>
+          </a:p>
+          <a:p>
+            <a:r>
+              <a:rPr lang="en-US" dirty="0"/>
+              <a:t>Open folder in vs code</a:t>
+            </a:r>
+          </a:p>
+          <a:p>
+            <a:r>
+              <a:rPr lang="en-US" dirty="0"/>
+              <a:t>Update </a:t>
+            </a:r>
+            <a:r>
+              <a:rPr lang="en-US" dirty="0" err="1"/>
+              <a:t>yml</a:t>
+            </a:r>
+            <a:r>
+              <a:rPr lang="en-US" dirty="0"/>
+              <a:t> – node name, enable </a:t>
+            </a:r>
+            <a:r>
+              <a:rPr lang="en-US" dirty="0" err="1"/>
+              <a:t>cors</a:t>
+            </a:r>
+            <a:endParaRPr lang="en-US" dirty="0"/>
+          </a:p>
+          <a:p>
+            <a:r>
+              <a:rPr lang="en-US" dirty="0"/>
+              <a:t>Start elastic</a:t>
+            </a:r>
+          </a:p>
+          <a:p>
+            <a:r>
+              <a:rPr lang="en-US" dirty="0"/>
+              <a:t>Ingest some data</a:t>
+            </a:r>
+          </a:p>
+          <a:p>
+            <a:r>
+              <a:rPr lang="en-US" dirty="0"/>
+              <a:t>Static html with </a:t>
+            </a:r>
+            <a:r>
+              <a:rPr lang="en-US" dirty="0" err="1"/>
+              <a:t>jquery</a:t>
+            </a:r>
+            <a:r>
+              <a:rPr lang="en-US" dirty="0"/>
+              <a:t> example</a:t>
+            </a:r>
+          </a:p>
+          <a:p>
+            <a:endParaRPr lang="en-US" dirty="0"/>
           </a:p>
         </p:txBody>
       </p:sp>
     </p:spTree>
     <p:extLst>
       <p:ext uri="{BB962C8B-B14F-4D97-AF65-F5344CB8AC3E}">
-        <p14:creationId xmlns:p14="http://schemas.microsoft.com/office/powerpoint/2010/main" val="1046468866"/>
-      </p:ext>
-    </p:extLst>
-  </p:cSld>
-  <p:clrMapOvr>
-    <a:masterClrMapping/>
-  </p:clrMapOvr>
-</p:sld>
-</file>
-
-<file path=ppt/slides/slide10.xml><?xml version="1.0" encoding="utf-8"?>
-<p:sld xmlns:a="http://schemas.openxmlformats.org/drawingml/2006/main" xmlns:r="http://schemas.openxmlformats.org/officeDocument/2006/relationships" xmlns:p="http://schemas.openxmlformats.org/presentationml/2006/main">
-  <p:cSld>
-    <p:spTree>
-      <p:nvGrpSpPr>
-        <p:cNvPr id="1" name=""/>
-        <p:cNvGrpSpPr/>
-        <p:nvPr/>
-      </p:nvGrpSpPr>
-      <p:grpSpPr>
-        <a:xfrm>
-          <a:off x="0" y="0"/>
-          <a:ext cx="0" cy="0"/>
-          <a:chOff x="0" y="0"/>
-          <a:chExt cx="0" cy="0"/>
-        </a:xfrm>
-      </p:grpSpPr>
-      <p:sp>
-        <p:nvSpPr>
-          <p:cNvPr id="2" name="Title 1">
-            <a:extLst>
-              <a:ext uri="{FF2B5EF4-FFF2-40B4-BE49-F238E27FC236}">
-                <a16:creationId xmlns:a16="http://schemas.microsoft.com/office/drawing/2014/main" id="{0F9E919B-8E9B-4A1C-BC5B-9F93DF1F3A0F}"/>
-              </a:ext>
-            </a:extLst>
-          </p:cNvPr>
-          <p:cNvSpPr>
-            <a:spLocks noGrp="1"/>
-          </p:cNvSpPr>
-          <p:nvPr>
-            <p:ph type="title"/>
-          </p:nvPr>
-        </p:nvSpPr>
-        <p:spPr/>
-        <p:txBody>
-          <a:bodyPr/>
-          <a:lstStyle/>
-          <a:p>
-            <a:r>
-              <a:rPr lang="en-US" dirty="0" err="1"/>
-              <a:t>TimedHostedEnrichment</a:t>
-            </a:r>
-            <a:r>
-              <a:rPr lang="en-US" dirty="0"/>
-              <a:t> service</a:t>
-            </a:r>
-          </a:p>
-        </p:txBody>
-      </p:sp>
-      <p:sp>
-        <p:nvSpPr>
-          <p:cNvPr id="3" name="Content Placeholder 2">
-            <a:extLst>
-              <a:ext uri="{FF2B5EF4-FFF2-40B4-BE49-F238E27FC236}">
-                <a16:creationId xmlns:a16="http://schemas.microsoft.com/office/drawing/2014/main" id="{C76C0AAB-1860-434A-B727-0951F6564298}"/>
-              </a:ext>
-            </a:extLst>
-          </p:cNvPr>
-          <p:cNvSpPr>
-            <a:spLocks noGrp="1"/>
-          </p:cNvSpPr>
-          <p:nvPr>
-            <p:ph idx="1"/>
-          </p:nvPr>
-        </p:nvSpPr>
-        <p:spPr/>
-        <p:txBody>
-          <a:bodyPr/>
-          <a:lstStyle/>
-          <a:p>
-            <a:r>
-              <a:rPr lang="en-US" dirty="0"/>
-              <a:t>Add </a:t>
-            </a:r>
-            <a:r>
-              <a:rPr lang="en-US" dirty="0" err="1"/>
-              <a:t>TimeHostedEnrichmentService</a:t>
-            </a:r>
-            <a:r>
-              <a:rPr lang="en-US" dirty="0"/>
-              <a:t> to aggregate and enrich </a:t>
-            </a:r>
-            <a:r>
-              <a:rPr lang="en-US" dirty="0" err="1"/>
-              <a:t>clicktrack</a:t>
-            </a:r>
-            <a:r>
-              <a:rPr lang="en-US" dirty="0"/>
-              <a:t> information to alter the search results based on user interaction</a:t>
-            </a:r>
-          </a:p>
-          <a:p>
-            <a:r>
-              <a:rPr lang="en-US" dirty="0"/>
-              <a:t>Register </a:t>
-            </a:r>
-            <a:r>
-              <a:rPr lang="en-US" dirty="0" err="1"/>
-              <a:t>TimeHostedEnrichement</a:t>
-            </a:r>
-            <a:r>
-              <a:rPr lang="en-US" dirty="0"/>
-              <a:t> service</a:t>
-            </a:r>
-          </a:p>
-          <a:p>
-            <a:pPr lvl="1"/>
-            <a:r>
-              <a:rPr lang="en-US" dirty="0" err="1"/>
-              <a:t>services.AddHostedService</a:t>
-            </a:r>
-            <a:r>
-              <a:rPr lang="en-US" dirty="0"/>
-              <a:t>&lt;</a:t>
-            </a:r>
-            <a:r>
-              <a:rPr lang="en-US" dirty="0" err="1"/>
-              <a:t>TimedHostedEnrichementService</a:t>
-            </a:r>
-            <a:r>
-              <a:rPr lang="en-US" dirty="0"/>
-              <a:t>&gt;();</a:t>
-            </a:r>
-          </a:p>
-          <a:p>
-            <a:r>
-              <a:rPr lang="en-US" dirty="0"/>
-              <a:t>Start app.. View logs</a:t>
-            </a:r>
-          </a:p>
-          <a:p>
-            <a:r>
-              <a:rPr lang="en-US" dirty="0"/>
-              <a:t>Validate</a:t>
-            </a:r>
-          </a:p>
-          <a:p>
-            <a:r>
-              <a:rPr lang="en-US" dirty="0"/>
-              <a:t>Add sorting to the get query in </a:t>
-            </a:r>
-            <a:r>
-              <a:rPr lang="en-US"/>
-              <a:t>the controller</a:t>
-            </a:r>
-            <a:endParaRPr lang="en-US" dirty="0"/>
-          </a:p>
-          <a:p>
-            <a:pPr lvl="1"/>
-            <a:endParaRPr lang="en-US" dirty="0"/>
-          </a:p>
-          <a:p>
-            <a:pPr lvl="1"/>
-            <a:endParaRPr lang="en-US" dirty="0"/>
-          </a:p>
-          <a:p>
-            <a:endParaRPr lang="en-US" dirty="0"/>
-          </a:p>
-        </p:txBody>
-      </p:sp>
-    </p:spTree>
-    <p:extLst>
-      <p:ext uri="{BB962C8B-B14F-4D97-AF65-F5344CB8AC3E}">
-        <p14:creationId xmlns:p14="http://schemas.microsoft.com/office/powerpoint/2010/main" val="2229548722"/>
+        <p14:creationId xmlns:p14="http://schemas.microsoft.com/office/powerpoint/2010/main" val="3284447323"/>
       </p:ext>
     </p:extLst>
   </p:cSld>
@@ -3702,7 +3479,7 @@
           <p:cNvPr id="2" name="Title 1">
             <a:extLst>
               <a:ext uri="{FF2B5EF4-FFF2-40B4-BE49-F238E27FC236}">
-                <a16:creationId xmlns:a16="http://schemas.microsoft.com/office/drawing/2014/main" id="{17C1B3BC-BE02-4F43-9268-91544E3188E4}"/>
+                <a16:creationId xmlns:a16="http://schemas.microsoft.com/office/drawing/2014/main" id="{E3A2690B-E308-4695-9221-5C97669C2105}"/>
               </a:ext>
             </a:extLst>
           </p:cNvPr>
@@ -3720,7 +3497,7 @@
           <a:p>
             <a:r>
               <a:rPr lang="en-US" dirty="0"/>
-              <a:t>0. It’s easy.. right</a:t>
+              <a:t>1. Git clone and run locally</a:t>
             </a:r>
           </a:p>
         </p:txBody>
@@ -3730,7 +3507,7 @@
           <p:cNvPr id="3" name="Content Placeholder 2">
             <a:extLst>
               <a:ext uri="{FF2B5EF4-FFF2-40B4-BE49-F238E27FC236}">
-                <a16:creationId xmlns:a16="http://schemas.microsoft.com/office/drawing/2014/main" id="{BC72CAF8-7C43-4BDC-AC92-3964F5B0CC15}"/>
+                <a16:creationId xmlns:a16="http://schemas.microsoft.com/office/drawing/2014/main" id="{8CFE3957-6364-49C3-B74A-48BF86929D16}"/>
               </a:ext>
             </a:extLst>
           </p:cNvPr>
@@ -3743,66 +3520,152 @@
         </p:nvSpPr>
         <p:spPr/>
         <p:txBody>
-          <a:bodyPr/>
-          <a:lstStyle/>
-          <a:p>
-            <a:r>
-              <a:rPr lang="en-US" dirty="0"/>
-              <a:t>“download” elastic</a:t>
-            </a:r>
-          </a:p>
-          <a:p>
-            <a:r>
-              <a:rPr lang="en-US" dirty="0"/>
-              <a:t>Open folder in vs code</a:t>
-            </a:r>
-          </a:p>
-          <a:p>
-            <a:r>
-              <a:rPr lang="en-US" dirty="0"/>
-              <a:t>Update </a:t>
+          <a:bodyPr>
+            <a:normAutofit fontScale="77500" lnSpcReduction="20000"/>
+          </a:bodyPr>
+          <a:lstStyle/>
+          <a:p>
+            <a:r>
+              <a:rPr lang="en-US" dirty="0"/>
+              <a:t>git clone https://github.com/rclaice/herocore.git</a:t>
+            </a:r>
+          </a:p>
+          <a:p>
+            <a:r>
+              <a:rPr lang="en-US" dirty="0"/>
+              <a:t>cd </a:t>
             </a:r>
             <a:r>
               <a:rPr lang="en-US" dirty="0" err="1"/>
-              <a:t>yml</a:t>
-            </a:r>
-            <a:r>
-              <a:rPr lang="en-US" dirty="0"/>
-              <a:t> – node name, enable </a:t>
+              <a:t>herocore</a:t>
+            </a:r>
+            <a:endParaRPr lang="en-US" dirty="0"/>
+          </a:p>
+          <a:p>
+            <a:r>
+              <a:rPr lang="en-US" dirty="0"/>
+              <a:t>git checkout working</a:t>
+            </a:r>
+          </a:p>
+          <a:p>
+            <a:r>
+              <a:rPr lang="en-US" dirty="0"/>
+              <a:t>Open folder </a:t>
             </a:r>
             <a:r>
               <a:rPr lang="en-US" dirty="0" err="1"/>
-              <a:t>cors</a:t>
+              <a:t>herocore</a:t>
+            </a:r>
+            <a:r>
+              <a:rPr lang="en-US" dirty="0"/>
+              <a:t>/</a:t>
+            </a:r>
+            <a:r>
+              <a:rPr lang="en-US" dirty="0" err="1"/>
+              <a:t>coreheroes</a:t>
             </a:r>
             <a:endParaRPr lang="en-US" dirty="0"/>
           </a:p>
           <a:p>
             <a:r>
               <a:rPr lang="en-US" dirty="0"/>
-              <a:t>Start elastic</a:t>
-            </a:r>
-          </a:p>
-          <a:p>
-            <a:r>
-              <a:rPr lang="en-US" dirty="0"/>
-              <a:t>Ingest some data</a:t>
-            </a:r>
-          </a:p>
-          <a:p>
-            <a:r>
-              <a:rPr lang="en-US" dirty="0"/>
-              <a:t>Static html with </a:t>
+              <a:t>From terminal change directory to </a:t>
             </a:r>
             <a:r>
               <a:rPr lang="en-US" dirty="0" err="1"/>
-              <a:t>jquery</a:t>
-            </a:r>
-            <a:r>
-              <a:rPr lang="en-US" dirty="0"/>
-              <a:t> example</a:t>
-            </a:r>
-          </a:p>
-          <a:p>
+              <a:t>ClientApp</a:t>
+            </a:r>
+            <a:endParaRPr lang="en-US" dirty="0"/>
+          </a:p>
+          <a:p>
+            <a:pPr lvl="1"/>
+            <a:r>
+              <a:rPr lang="en-US" dirty="0"/>
+              <a:t>ng update @angular/cli</a:t>
+            </a:r>
+          </a:p>
+          <a:p>
+            <a:pPr lvl="1"/>
+            <a:r>
+              <a:rPr lang="en-US" dirty="0" err="1"/>
+              <a:t>npm</a:t>
+            </a:r>
+            <a:r>
+              <a:rPr lang="en-US" dirty="0"/>
+              <a:t> install </a:t>
+            </a:r>
+          </a:p>
+          <a:p>
+            <a:r>
+              <a:rPr lang="en-US" dirty="0"/>
+              <a:t>F5 .. After </a:t>
+            </a:r>
+            <a:r>
+              <a:rPr lang="en-US" dirty="0" err="1"/>
+              <a:t>transpile</a:t>
+            </a:r>
+            <a:r>
+              <a:rPr lang="en-US" dirty="0"/>
+              <a:t> etc.. You should see the tour of heroes demo application</a:t>
+            </a:r>
+          </a:p>
+          <a:p>
+            <a:pPr lvl="1"/>
+            <a:r>
+              <a:rPr lang="en-US" dirty="0"/>
+              <a:t>In memory </a:t>
+            </a:r>
+            <a:r>
+              <a:rPr lang="en-US" dirty="0" err="1"/>
+              <a:t>api</a:t>
+            </a:r>
+            <a:r>
+              <a:rPr lang="en-US" dirty="0"/>
+              <a:t> </a:t>
+            </a:r>
+          </a:p>
+          <a:p>
+            <a:pPr lvl="1"/>
+            <a:r>
+              <a:rPr lang="en-US" dirty="0"/>
+              <a:t>Walk through app</a:t>
+            </a:r>
+          </a:p>
+          <a:p>
+            <a:pPr lvl="1"/>
+            <a:r>
+              <a:rPr lang="en-US" dirty="0"/>
+              <a:t>Services</a:t>
+            </a:r>
+          </a:p>
+          <a:p>
+            <a:pPr lvl="1"/>
+            <a:r>
+              <a:rPr lang="en-US" dirty="0"/>
+              <a:t>Hero - component</a:t>
+            </a:r>
+          </a:p>
+          <a:p>
+            <a:pPr lvl="1"/>
+            <a:r>
+              <a:rPr lang="en-US" dirty="0"/>
+              <a:t>Heroes- component</a:t>
+            </a:r>
+          </a:p>
+          <a:p>
+            <a:pPr lvl="1"/>
+            <a:r>
+              <a:rPr lang="en-US" dirty="0"/>
+              <a:t>Dashboard- component</a:t>
+            </a:r>
+          </a:p>
+          <a:p>
+            <a:endParaRPr lang="en-US" dirty="0"/>
+          </a:p>
+          <a:p>
+            <a:pPr marL="0" indent="0">
+              <a:buNone/>
+            </a:pPr>
             <a:endParaRPr lang="en-US" dirty="0"/>
           </a:p>
         </p:txBody>
@@ -3810,7 +3673,7 @@
     </p:spTree>
     <p:extLst>
       <p:ext uri="{BB962C8B-B14F-4D97-AF65-F5344CB8AC3E}">
-        <p14:creationId xmlns:p14="http://schemas.microsoft.com/office/powerpoint/2010/main" val="3284447323"/>
+        <p14:creationId xmlns:p14="http://schemas.microsoft.com/office/powerpoint/2010/main" val="3827552082"/>
       </p:ext>
     </p:extLst>
   </p:cSld>
@@ -3842,7 +3705,7 @@
           <p:cNvPr id="2" name="Title 1">
             <a:extLst>
               <a:ext uri="{FF2B5EF4-FFF2-40B4-BE49-F238E27FC236}">
-                <a16:creationId xmlns:a16="http://schemas.microsoft.com/office/drawing/2014/main" id="{E3A2690B-E308-4695-9221-5C97669C2105}"/>
+                <a16:creationId xmlns:a16="http://schemas.microsoft.com/office/drawing/2014/main" id="{68C33593-6BFA-4332-9EB9-1F31DAB4C797}"/>
               </a:ext>
             </a:extLst>
           </p:cNvPr>
@@ -3860,7 +3723,7 @@
           <a:p>
             <a:r>
               <a:rPr lang="en-US" dirty="0"/>
-              <a:t>1. Git clone and run locally</a:t>
+              <a:t>2. Elastic Heroes</a:t>
             </a:r>
           </a:p>
         </p:txBody>
@@ -3870,7 +3733,7 @@
           <p:cNvPr id="3" name="Content Placeholder 2">
             <a:extLst>
               <a:ext uri="{FF2B5EF4-FFF2-40B4-BE49-F238E27FC236}">
-                <a16:creationId xmlns:a16="http://schemas.microsoft.com/office/drawing/2014/main" id="{8CFE3957-6364-49C3-B74A-48BF86929D16}"/>
+                <a16:creationId xmlns:a16="http://schemas.microsoft.com/office/drawing/2014/main" id="{BB4AAA99-5398-4274-A0C3-69A19FB60AFB}"/>
               </a:ext>
             </a:extLst>
           </p:cNvPr>
@@ -3883,67 +3746,87 @@
         </p:nvSpPr>
         <p:spPr/>
         <p:txBody>
-          <a:bodyPr/>
-          <a:lstStyle/>
-          <a:p>
-            <a:r>
-              <a:rPr lang="en-US" dirty="0"/>
-              <a:t>In memory </a:t>
+          <a:bodyPr>
+            <a:normAutofit lnSpcReduction="10000"/>
+          </a:bodyPr>
+          <a:lstStyle/>
+          <a:p>
+            <a:r>
+              <a:rPr lang="en-US" dirty="0"/>
+              <a:t>Open elastic search (cloud)</a:t>
+            </a:r>
+          </a:p>
+          <a:p>
+            <a:pPr lvl="1"/>
+            <a:r>
+              <a:rPr lang="en-US" dirty="0">
+                <a:hlinkClick r:id="rId2"/>
+              </a:rPr>
+              <a:t>https://202655219ac74df5b3452924c9c73f71.us-east-1.aws.found.io:9243</a:t>
+            </a:r>
+            <a:r>
+              <a:rPr lang="en-US" dirty="0"/>
+              <a:t>	</a:t>
+            </a:r>
+          </a:p>
+          <a:p>
+            <a:r>
+              <a:rPr lang="en-US" dirty="0"/>
+              <a:t>Ingest data using curl from command line</a:t>
+            </a:r>
+          </a:p>
+          <a:p>
+            <a:r>
+              <a:rPr lang="en-US" dirty="0"/>
+              <a:t>Register </a:t>
+            </a:r>
+            <a:r>
+              <a:rPr lang="en-US" dirty="0" err="1"/>
+              <a:t>httpclientfactory</a:t>
+            </a:r>
+            <a:endParaRPr lang="en-US" dirty="0"/>
+          </a:p>
+          <a:p>
+            <a:r>
+              <a:rPr lang="en-US" dirty="0"/>
+              <a:t>Add controller and inject client factory</a:t>
+            </a:r>
+          </a:p>
+          <a:p>
+            <a:r>
+              <a:rPr lang="en-US" dirty="0"/>
+              <a:t>Implement get heroes</a:t>
+            </a:r>
+          </a:p>
+          <a:p>
+            <a:r>
+              <a:rPr lang="en-US" dirty="0"/>
+              <a:t>Implement search/put/post methods</a:t>
+            </a:r>
+          </a:p>
+          <a:p>
+            <a:r>
+              <a:rPr lang="en-US" dirty="0"/>
+              <a:t>Unregister in-memory-</a:t>
             </a:r>
             <a:r>
               <a:rPr lang="en-US" dirty="0" err="1"/>
               <a:t>api</a:t>
             </a:r>
-            <a:r>
-              <a:rPr lang="en-US" dirty="0"/>
-              <a:t> </a:t>
-            </a:r>
-          </a:p>
-          <a:p>
-            <a:r>
-              <a:rPr lang="en-US" dirty="0"/>
-              <a:t>Walk through app</a:t>
-            </a:r>
-          </a:p>
-          <a:p>
-            <a:r>
-              <a:rPr lang="en-US" dirty="0"/>
-              <a:t>Service</a:t>
-            </a:r>
-          </a:p>
-          <a:p>
-            <a:r>
-              <a:rPr lang="en-US" dirty="0"/>
-              <a:t>Hero</a:t>
-            </a:r>
-          </a:p>
-          <a:p>
-            <a:r>
-              <a:rPr lang="en-US" dirty="0"/>
-              <a:t>Heroes</a:t>
-            </a:r>
-          </a:p>
-          <a:p>
-            <a:r>
-              <a:rPr lang="en-US" dirty="0"/>
-              <a:t>Dashboard</a:t>
-            </a:r>
-          </a:p>
-          <a:p>
             <a:endParaRPr lang="en-US" dirty="0"/>
           </a:p>
           <a:p>
-            <a:pPr marL="0" indent="0">
-              <a:buNone/>
-            </a:pPr>
-            <a:endParaRPr lang="en-US" dirty="0"/>
+            <a:r>
+              <a:rPr lang="en-US" dirty="0"/>
+              <a:t>Alter some data and show in elastic and client</a:t>
+            </a:r>
           </a:p>
         </p:txBody>
       </p:sp>
     </p:spTree>
     <p:extLst>
       <p:ext uri="{BB962C8B-B14F-4D97-AF65-F5344CB8AC3E}">
-        <p14:creationId xmlns:p14="http://schemas.microsoft.com/office/powerpoint/2010/main" val="3827552082"/>
+        <p14:creationId xmlns:p14="http://schemas.microsoft.com/office/powerpoint/2010/main" val="3533953869"/>
       </p:ext>
     </p:extLst>
   </p:cSld>
@@ -3975,7 +3858,7 @@
           <p:cNvPr id="2" name="Title 1">
             <a:extLst>
               <a:ext uri="{FF2B5EF4-FFF2-40B4-BE49-F238E27FC236}">
-                <a16:creationId xmlns:a16="http://schemas.microsoft.com/office/drawing/2014/main" id="{68C33593-6BFA-4332-9EB9-1F31DAB4C797}"/>
+                <a16:creationId xmlns:a16="http://schemas.microsoft.com/office/drawing/2014/main" id="{28086AF8-68D7-423F-90C7-7FE972C3CCAA}"/>
               </a:ext>
             </a:extLst>
           </p:cNvPr>
@@ -3993,7 +3876,7 @@
           <a:p>
             <a:r>
               <a:rPr lang="en-US" dirty="0"/>
-              <a:t>2. Elastic Heroes</a:t>
+              <a:t>3. Track Clicks</a:t>
             </a:r>
           </a:p>
         </p:txBody>
@@ -4003,7 +3886,7 @@
           <p:cNvPr id="3" name="Content Placeholder 2">
             <a:extLst>
               <a:ext uri="{FF2B5EF4-FFF2-40B4-BE49-F238E27FC236}">
-                <a16:creationId xmlns:a16="http://schemas.microsoft.com/office/drawing/2014/main" id="{BB4AAA99-5398-4274-A0C3-69A19FB60AFB}"/>
+                <a16:creationId xmlns:a16="http://schemas.microsoft.com/office/drawing/2014/main" id="{2E789CD3-67AA-4C82-881C-F54265A2CFEC}"/>
               </a:ext>
             </a:extLst>
           </p:cNvPr>
@@ -4021,67 +3904,88 @@
           <a:p>
             <a:r>
               <a:rPr lang="en-US" dirty="0"/>
-              <a:t>Open elastic search (cloud)</a:t>
-            </a:r>
-          </a:p>
-          <a:p>
-            <a:r>
-              <a:rPr lang="en-US" dirty="0"/>
-              <a:t>Ingest data using curl from command line</a:t>
-            </a:r>
-          </a:p>
-          <a:p>
-            <a:r>
-              <a:rPr lang="en-US" dirty="0"/>
-              <a:t>Register </a:t>
+              <a:t>Add object model</a:t>
+            </a:r>
+          </a:p>
+          <a:p>
+            <a:r>
+              <a:rPr lang="en-US" dirty="0"/>
+              <a:t>Add service</a:t>
+            </a:r>
+          </a:p>
+          <a:p>
+            <a:pPr lvl="1"/>
+            <a:r>
+              <a:rPr lang="en-US" dirty="0"/>
+              <a:t>Ng generate service </a:t>
             </a:r>
             <a:r>
               <a:rPr lang="en-US" dirty="0" err="1"/>
-              <a:t>httpclientfactory</a:t>
+              <a:t>clicktrack</a:t>
             </a:r>
             <a:endParaRPr lang="en-US" dirty="0"/>
           </a:p>
           <a:p>
             <a:r>
               <a:rPr lang="en-US" dirty="0"/>
-              <a:t>Add controller and inject client factory</a:t>
-            </a:r>
-          </a:p>
-          <a:p>
-            <a:r>
-              <a:rPr lang="en-US" dirty="0"/>
-              <a:t>Implement get heroes</a:t>
-            </a:r>
-          </a:p>
-          <a:p>
-            <a:r>
-              <a:rPr lang="en-US" dirty="0"/>
-              <a:t>Implement search/put/post methods</a:t>
-            </a:r>
-          </a:p>
-          <a:p>
-            <a:r>
-              <a:rPr lang="en-US" dirty="0"/>
-              <a:t>Unregister in-memory-</a:t>
+              <a:t>Register service (heroes, dashboard)</a:t>
+            </a:r>
+          </a:p>
+          <a:p>
+            <a:r>
+              <a:rPr lang="en-US" dirty="0"/>
+              <a:t>Implement click/add click</a:t>
+            </a:r>
+          </a:p>
+          <a:p>
+            <a:r>
+              <a:rPr lang="en-US" dirty="0"/>
+              <a:t>Add </a:t>
             </a:r>
             <a:r>
               <a:rPr lang="en-US" dirty="0" err="1"/>
-              <a:t>api</a:t>
+              <a:t>clicktracking</a:t>
+            </a:r>
+            <a:r>
+              <a:rPr lang="en-US" dirty="0"/>
+              <a:t> controller</a:t>
+            </a:r>
+          </a:p>
+          <a:p>
+            <a:r>
+              <a:rPr lang="en-US" dirty="0"/>
+              <a:t>Open </a:t>
+            </a:r>
+            <a:r>
+              <a:rPr lang="en-US" dirty="0" err="1"/>
+              <a:t>kibana</a:t>
             </a:r>
             <a:endParaRPr lang="en-US" dirty="0"/>
           </a:p>
           <a:p>
-            <a:r>
-              <a:rPr lang="en-US" dirty="0"/>
-              <a:t>Alter some data and show in elastic and client</a:t>
-            </a:r>
+            <a:pPr lvl="1"/>
+            <a:r>
+              <a:rPr lang="en-US" dirty="0"/>
+              <a:t>Create index profile</a:t>
+            </a:r>
+          </a:p>
+          <a:p>
+            <a:pPr lvl="1"/>
+            <a:r>
+              <a:rPr lang="en-US" dirty="0"/>
+              <a:t>Show time based analysis</a:t>
+            </a:r>
+          </a:p>
+          <a:p>
+            <a:pPr lvl="1"/>
+            <a:endParaRPr lang="en-US" dirty="0"/>
           </a:p>
         </p:txBody>
       </p:sp>
     </p:spTree>
     <p:extLst>
       <p:ext uri="{BB962C8B-B14F-4D97-AF65-F5344CB8AC3E}">
-        <p14:creationId xmlns:p14="http://schemas.microsoft.com/office/powerpoint/2010/main" val="3533953869"/>
+        <p14:creationId xmlns:p14="http://schemas.microsoft.com/office/powerpoint/2010/main" val="1697352381"/>
       </p:ext>
     </p:extLst>
   </p:cSld>
@@ -4113,7 +4017,7 @@
           <p:cNvPr id="2" name="Title 1">
             <a:extLst>
               <a:ext uri="{FF2B5EF4-FFF2-40B4-BE49-F238E27FC236}">
-                <a16:creationId xmlns:a16="http://schemas.microsoft.com/office/drawing/2014/main" id="{28086AF8-68D7-423F-90C7-7FE972C3CCAA}"/>
+                <a16:creationId xmlns:a16="http://schemas.microsoft.com/office/drawing/2014/main" id="{EDF13D41-4712-4A9D-B5DD-4D0AC13A6F6E}"/>
               </a:ext>
             </a:extLst>
           </p:cNvPr>
@@ -4131,7 +4035,7 @@
           <a:p>
             <a:r>
               <a:rPr lang="en-US" dirty="0"/>
-              <a:t>3. Track Clicks</a:t>
+              <a:t>4. User feedback with enrichment</a:t>
             </a:r>
           </a:p>
         </p:txBody>
@@ -4141,7 +4045,7 @@
           <p:cNvPr id="3" name="Content Placeholder 2">
             <a:extLst>
               <a:ext uri="{FF2B5EF4-FFF2-40B4-BE49-F238E27FC236}">
-                <a16:creationId xmlns:a16="http://schemas.microsoft.com/office/drawing/2014/main" id="{2E789CD3-67AA-4C82-881C-F54265A2CFEC}"/>
+                <a16:creationId xmlns:a16="http://schemas.microsoft.com/office/drawing/2014/main" id="{329B408E-D117-4563-973F-AA1224A1A996}"/>
               </a:ext>
             </a:extLst>
           </p:cNvPr>
@@ -4156,44 +4060,6 @@
         <p:txBody>
           <a:bodyPr/>
           <a:lstStyle/>
-          <a:p>
-            <a:r>
-              <a:rPr lang="en-US" dirty="0"/>
-              <a:t>Add object model</a:t>
-            </a:r>
-          </a:p>
-          <a:p>
-            <a:r>
-              <a:rPr lang="en-US" dirty="0"/>
-              <a:t>Add service</a:t>
-            </a:r>
-          </a:p>
-          <a:p>
-            <a:r>
-              <a:rPr lang="en-US" dirty="0"/>
-              <a:t>Register service (heroes, dashboard)</a:t>
-            </a:r>
-          </a:p>
-          <a:p>
-            <a:r>
-              <a:rPr lang="en-US" dirty="0"/>
-              <a:t>Implement click/add click</a:t>
-            </a:r>
-          </a:p>
-          <a:p>
-            <a:r>
-              <a:rPr lang="en-US" dirty="0"/>
-              <a:t>Add </a:t>
-            </a:r>
-            <a:r>
-              <a:rPr lang="en-US" dirty="0" err="1"/>
-              <a:t>clicktracking</a:t>
-            </a:r>
-            <a:r>
-              <a:rPr lang="en-US" dirty="0"/>
-              <a:t> controller</a:t>
-            </a:r>
-          </a:p>
           <a:p>
             <a:r>
               <a:rPr lang="en-US" dirty="0"/>
@@ -4209,18 +4075,54 @@
             <a:pPr lvl="1"/>
             <a:r>
               <a:rPr lang="en-US" dirty="0"/>
-              <a:t>Create index profile</a:t>
+              <a:t>Talk about how we might use information gathered</a:t>
             </a:r>
           </a:p>
           <a:p>
             <a:pPr lvl="1"/>
             <a:r>
               <a:rPr lang="en-US" dirty="0"/>
-              <a:t>Show time based analysis</a:t>
-            </a:r>
-          </a:p>
-          <a:p>
-            <a:pPr lvl="1"/>
+              <a:t>Start a monitoring dashboard for top </a:t>
+            </a:r>
+            <a:r>
+              <a:rPr lang="en-US" dirty="0" err="1"/>
+              <a:t>heros</a:t>
+            </a:r>
+            <a:r>
+              <a:rPr lang="en-US" dirty="0"/>
+              <a:t> by clicks</a:t>
+            </a:r>
+          </a:p>
+          <a:p>
+            <a:r>
+              <a:rPr lang="en-US" dirty="0"/>
+              <a:t>Add </a:t>
+            </a:r>
+            <a:r>
+              <a:rPr lang="en-US" dirty="0" err="1"/>
+              <a:t>timerbase</a:t>
+            </a:r>
+            <a:r>
+              <a:rPr lang="en-US" dirty="0"/>
+              <a:t> service</a:t>
+            </a:r>
+          </a:p>
+          <a:p>
+            <a:r>
+              <a:rPr lang="en-US" dirty="0"/>
+              <a:t>Register timer service</a:t>
+            </a:r>
+          </a:p>
+          <a:p>
+            <a:r>
+              <a:rPr lang="en-US" dirty="0"/>
+              <a:t>Do some work (selenium)?</a:t>
+            </a:r>
+          </a:p>
+          <a:p>
+            <a:pPr marL="0" indent="0">
+              <a:buNone/>
+            </a:pPr>
             <a:endParaRPr lang="en-US" dirty="0"/>
           </a:p>
         </p:txBody>
@@ -4228,7 +4130,7 @@
     </p:spTree>
     <p:extLst>
       <p:ext uri="{BB962C8B-B14F-4D97-AF65-F5344CB8AC3E}">
-        <p14:creationId xmlns:p14="http://schemas.microsoft.com/office/powerpoint/2010/main" val="1697352381"/>
+        <p14:creationId xmlns:p14="http://schemas.microsoft.com/office/powerpoint/2010/main" val="683979399"/>
       </p:ext>
     </p:extLst>
   </p:cSld>
@@ -4260,7 +4162,7 @@
           <p:cNvPr id="2" name="Title 1">
             <a:extLst>
               <a:ext uri="{FF2B5EF4-FFF2-40B4-BE49-F238E27FC236}">
-                <a16:creationId xmlns:a16="http://schemas.microsoft.com/office/drawing/2014/main" id="{EDF13D41-4712-4A9D-B5DD-4D0AC13A6F6E}"/>
+                <a16:creationId xmlns:a16="http://schemas.microsoft.com/office/drawing/2014/main" id="{70107A4A-A51A-4609-A282-F04665481954}"/>
               </a:ext>
             </a:extLst>
           </p:cNvPr>
@@ -4278,7 +4180,7 @@
           <a:p>
             <a:r>
               <a:rPr lang="en-US" dirty="0"/>
-              <a:t>4. User feedback with enrichment</a:t>
+              <a:t>5. Summary</a:t>
             </a:r>
           </a:p>
         </p:txBody>
@@ -4288,7 +4190,7 @@
           <p:cNvPr id="3" name="Content Placeholder 2">
             <a:extLst>
               <a:ext uri="{FF2B5EF4-FFF2-40B4-BE49-F238E27FC236}">
-                <a16:creationId xmlns:a16="http://schemas.microsoft.com/office/drawing/2014/main" id="{329B408E-D117-4563-973F-AA1224A1A996}"/>
+                <a16:creationId xmlns:a16="http://schemas.microsoft.com/office/drawing/2014/main" id="{D98B74D5-AAB8-46E5-8F90-F990CB985D0D}"/>
               </a:ext>
             </a:extLst>
           </p:cNvPr>
@@ -4306,66 +4208,81 @@
           <a:p>
             <a:r>
               <a:rPr lang="en-US" dirty="0"/>
-              <a:t>Open </a:t>
+              <a:t>This was not a UX or Angular competition</a:t>
+            </a:r>
+          </a:p>
+          <a:p>
+            <a:r>
+              <a:rPr lang="en-US" dirty="0"/>
+              <a:t>We talked about using elastic and adding value to a site via feedback</a:t>
+            </a:r>
+          </a:p>
+          <a:p>
+            <a:r>
+              <a:rPr lang="en-US" dirty="0"/>
+              <a:t>There is much </a:t>
             </a:r>
             <a:r>
               <a:rPr lang="en-US" dirty="0" err="1"/>
-              <a:t>kibana</a:t>
-            </a:r>
-            <a:endParaRPr lang="en-US" dirty="0"/>
+              <a:t>much</a:t>
+            </a:r>
+            <a:r>
+              <a:rPr lang="en-US" dirty="0"/>
+              <a:t> </a:t>
+            </a:r>
+            <a:r>
+              <a:rPr lang="en-US" dirty="0" err="1"/>
+              <a:t>much</a:t>
+            </a:r>
+            <a:r>
+              <a:rPr lang="en-US" dirty="0"/>
+              <a:t> more</a:t>
+            </a:r>
           </a:p>
           <a:p>
             <a:pPr lvl="1"/>
             <a:r>
               <a:rPr lang="en-US" dirty="0"/>
-              <a:t>Talk about how we might use information gathered</a:t>
+              <a:t>Searching analyzers</a:t>
             </a:r>
           </a:p>
           <a:p>
             <a:pPr lvl="1"/>
             <a:r>
               <a:rPr lang="en-US" dirty="0"/>
-              <a:t>Start a monitoring dashboard for top </a:t>
-            </a:r>
-            <a:r>
-              <a:rPr lang="en-US" dirty="0" err="1"/>
-              <a:t>heros</a:t>
-            </a:r>
-            <a:r>
-              <a:rPr lang="en-US" dirty="0"/>
-              <a:t> by clicks</a:t>
-            </a:r>
-          </a:p>
-          <a:p>
-            <a:r>
-              <a:rPr lang="en-US" dirty="0"/>
-              <a:t>Add </a:t>
-            </a:r>
-            <a:r>
-              <a:rPr lang="en-US" dirty="0" err="1"/>
-              <a:t>timerbase</a:t>
-            </a:r>
-            <a:r>
-              <a:rPr lang="en-US" dirty="0"/>
-              <a:t> service</a:t>
-            </a:r>
-          </a:p>
-          <a:p>
-            <a:r>
-              <a:rPr lang="en-US" dirty="0"/>
-              <a:t>Register timer service</a:t>
-            </a:r>
-          </a:p>
-          <a:p>
-            <a:r>
-              <a:rPr lang="en-US" dirty="0"/>
-              <a:t>Do some work (selenium)?</a:t>
-            </a:r>
-          </a:p>
-          <a:p>
-            <a:pPr marL="0" indent="0">
-              <a:buNone/>
-            </a:pPr>
+              <a:t>Ingestion pipelines</a:t>
+            </a:r>
+          </a:p>
+          <a:p>
+            <a:pPr lvl="1"/>
+            <a:r>
+              <a:rPr lang="en-US" dirty="0"/>
+              <a:t>Query – boosting, multiple…</a:t>
+            </a:r>
+          </a:p>
+          <a:p>
+            <a:pPr lvl="1"/>
+            <a:r>
+              <a:rPr lang="en-US" dirty="0"/>
+              <a:t>Faceting/navigation</a:t>
+            </a:r>
+          </a:p>
+          <a:p>
+            <a:pPr lvl="1"/>
+            <a:r>
+              <a:rPr lang="en-US" dirty="0"/>
+              <a:t>Anomaly detection</a:t>
+            </a:r>
+          </a:p>
+          <a:p>
+            <a:pPr lvl="1"/>
+            <a:r>
+              <a:rPr lang="en-US" dirty="0"/>
+              <a:t>Graph</a:t>
+            </a:r>
+          </a:p>
+          <a:p>
+            <a:pPr lvl="1"/>
             <a:endParaRPr lang="en-US" dirty="0"/>
           </a:p>
         </p:txBody>
@@ -4373,7 +4290,7 @@
     </p:spTree>
     <p:extLst>
       <p:ext uri="{BB962C8B-B14F-4D97-AF65-F5344CB8AC3E}">
-        <p14:creationId xmlns:p14="http://schemas.microsoft.com/office/powerpoint/2010/main" val="683979399"/>
+        <p14:creationId xmlns:p14="http://schemas.microsoft.com/office/powerpoint/2010/main" val="2138735992"/>
       </p:ext>
     </p:extLst>
   </p:cSld>
@@ -4402,130 +4319,91 @@
       </p:grpSpPr>
       <p:sp>
         <p:nvSpPr>
-          <p:cNvPr id="2" name="Title 1">
-            <a:extLst>
-              <a:ext uri="{FF2B5EF4-FFF2-40B4-BE49-F238E27FC236}">
-                <a16:creationId xmlns:a16="http://schemas.microsoft.com/office/drawing/2014/main" id="{70107A4A-A51A-4609-A282-F04665481954}"/>
-              </a:ext>
-            </a:extLst>
-          </p:cNvPr>
-          <p:cNvSpPr>
-            <a:spLocks noGrp="1"/>
-          </p:cNvSpPr>
-          <p:nvPr>
-            <p:ph type="title"/>
-          </p:nvPr>
-        </p:nvSpPr>
-        <p:spPr/>
-        <p:txBody>
-          <a:bodyPr/>
-          <a:lstStyle/>
-          <a:p>
-            <a:r>
-              <a:rPr lang="en-US" dirty="0"/>
-              <a:t>5. Summary</a:t>
-            </a:r>
-          </a:p>
-        </p:txBody>
-      </p:sp>
-      <p:sp>
-        <p:nvSpPr>
-          <p:cNvPr id="3" name="Content Placeholder 2">
-            <a:extLst>
-              <a:ext uri="{FF2B5EF4-FFF2-40B4-BE49-F238E27FC236}">
-                <a16:creationId xmlns:a16="http://schemas.microsoft.com/office/drawing/2014/main" id="{D98B74D5-AAB8-46E5-8F90-F990CB985D0D}"/>
-              </a:ext>
-            </a:extLst>
-          </p:cNvPr>
-          <p:cNvSpPr>
-            <a:spLocks noGrp="1"/>
-          </p:cNvSpPr>
-          <p:nvPr>
-            <p:ph idx="1"/>
-          </p:nvPr>
-        </p:nvSpPr>
-        <p:spPr/>
-        <p:txBody>
-          <a:bodyPr/>
-          <a:lstStyle/>
-          <a:p>
-            <a:r>
-              <a:rPr lang="en-US" dirty="0"/>
-              <a:t>This was not a UX or Angular competition</a:t>
-            </a:r>
-          </a:p>
-          <a:p>
-            <a:r>
-              <a:rPr lang="en-US" dirty="0"/>
-              <a:t>We talked about using elastic and adding value to a site via feedback</a:t>
-            </a:r>
-          </a:p>
-          <a:p>
-            <a:r>
-              <a:rPr lang="en-US" dirty="0"/>
-              <a:t>There is much </a:t>
+          <p:cNvPr id="4" name="TextBox 3">
+            <a:extLst>
+              <a:ext uri="{FF2B5EF4-FFF2-40B4-BE49-F238E27FC236}">
+                <a16:creationId xmlns:a16="http://schemas.microsoft.com/office/drawing/2014/main" id="{43029F15-2181-45AA-A12E-75B0C40AD0BE}"/>
+              </a:ext>
+            </a:extLst>
+          </p:cNvPr>
+          <p:cNvSpPr txBox="1"/>
+          <p:nvPr/>
+        </p:nvSpPr>
+        <p:spPr>
+          <a:xfrm>
+            <a:off x="1124125" y="436228"/>
+            <a:ext cx="6493079" cy="2308324"/>
+          </a:xfrm>
+          <a:prstGeom prst="rect">
+            <a:avLst/>
+          </a:prstGeom>
+          <a:noFill/>
+        </p:spPr>
+        <p:txBody>
+          <a:bodyPr wrap="square" rtlCol="0">
+            <a:spAutoFit/>
+          </a:bodyPr>
+          <a:lstStyle/>
+          <a:p>
+            <a:r>
+              <a:rPr lang="en-US" dirty="0"/>
+              <a:t>Delete the spa app </a:t>
             </a:r>
             <a:r>
               <a:rPr lang="en-US" dirty="0" err="1"/>
-              <a:t>much</a:t>
-            </a:r>
+              <a:t>src</a:t>
+            </a:r>
+            <a:r>
+              <a:rPr lang="en-US" dirty="0"/>
+              <a:t> folder under Client App and replace with tour of heroes source (from tutorial) so we have some functionality – with the in memory service implementation</a:t>
+            </a:r>
+          </a:p>
+          <a:p>
+            <a:endParaRPr lang="en-US" dirty="0"/>
+          </a:p>
+          <a:p>
+            <a:r>
+              <a:rPr lang="en-US" dirty="0" err="1"/>
+              <a:t>Npm</a:t>
+            </a:r>
+            <a:r>
+              <a:rPr lang="en-US" dirty="0"/>
+              <a:t> install</a:t>
+            </a:r>
+          </a:p>
+          <a:p>
+            <a:r>
+              <a:rPr lang="en-US" dirty="0" err="1"/>
+              <a:t>npm</a:t>
+            </a:r>
+            <a:r>
+              <a:rPr lang="en-US" dirty="0"/>
+              <a:t> install angular-in-memory-web-</a:t>
+            </a:r>
+            <a:r>
+              <a:rPr lang="en-US" dirty="0" err="1"/>
+              <a:t>api</a:t>
+            </a:r>
+            <a:r>
+              <a:rPr lang="en-US" dirty="0"/>
+              <a:t> –save</a:t>
+            </a:r>
+          </a:p>
+          <a:p>
             <a:r>
               <a:rPr lang="en-US" dirty="0"/>
               <a:t> </a:t>
             </a:r>
             <a:r>
               <a:rPr lang="en-US" dirty="0" err="1"/>
-              <a:t>much</a:t>
-            </a:r>
-            <a:r>
-              <a:rPr lang="en-US" dirty="0"/>
-              <a:t> more</a:t>
-            </a:r>
-          </a:p>
-          <a:p>
-            <a:pPr lvl="1"/>
-            <a:r>
-              <a:rPr lang="en-US" dirty="0"/>
-              <a:t>Searching analyzers</a:t>
-            </a:r>
-          </a:p>
-          <a:p>
-            <a:pPr lvl="1"/>
-            <a:r>
-              <a:rPr lang="en-US" dirty="0"/>
-              <a:t>Ingestion pipelines</a:t>
-            </a:r>
-          </a:p>
-          <a:p>
-            <a:pPr lvl="1"/>
-            <a:r>
-              <a:rPr lang="en-US" dirty="0"/>
-              <a:t>Query – boosting, multiple…</a:t>
-            </a:r>
-          </a:p>
-          <a:p>
-            <a:pPr lvl="1"/>
-            <a:r>
-              <a:rPr lang="en-US" dirty="0"/>
-              <a:t>Faceting/navigation</a:t>
-            </a:r>
-          </a:p>
-          <a:p>
-            <a:pPr lvl="1"/>
-            <a:r>
-              <a:rPr lang="en-US" dirty="0"/>
-              <a:t>Anomaly detection</a:t>
-            </a:r>
-          </a:p>
-          <a:p>
-            <a:pPr lvl="1"/>
-            <a:r>
-              <a:rPr lang="en-US" dirty="0"/>
-              <a:t>Graph</a:t>
-            </a:r>
-          </a:p>
-          <a:p>
-            <a:pPr lvl="1"/>
+              <a:t>npm</a:t>
+            </a:r>
+            <a:r>
+              <a:rPr lang="en-US" dirty="0"/>
+              <a:t> audit fix</a:t>
+            </a:r>
+          </a:p>
+          <a:p>
             <a:endParaRPr lang="en-US" dirty="0"/>
           </a:p>
         </p:txBody>
@@ -4533,7 +4411,7 @@
     </p:spTree>
     <p:extLst>
       <p:ext uri="{BB962C8B-B14F-4D97-AF65-F5344CB8AC3E}">
-        <p14:creationId xmlns:p14="http://schemas.microsoft.com/office/powerpoint/2010/main" val="2138735992"/>
+        <p14:creationId xmlns:p14="http://schemas.microsoft.com/office/powerpoint/2010/main" val="1047589209"/>
       </p:ext>
     </p:extLst>
   </p:cSld>
@@ -4565,7 +4443,7 @@
           <p:cNvPr id="4" name="TextBox 3">
             <a:extLst>
               <a:ext uri="{FF2B5EF4-FFF2-40B4-BE49-F238E27FC236}">
-                <a16:creationId xmlns:a16="http://schemas.microsoft.com/office/drawing/2014/main" id="{43029F15-2181-45AA-A12E-75B0C40AD0BE}"/>
+                <a16:creationId xmlns:a16="http://schemas.microsoft.com/office/drawing/2014/main" id="{7B06F338-C4AD-447A-9DC5-4BB7527BDB24}"/>
               </a:ext>
             </a:extLst>
           </p:cNvPr>
@@ -4574,8 +4452,8 @@
         </p:nvSpPr>
         <p:spPr>
           <a:xfrm>
-            <a:off x="1124125" y="436228"/>
-            <a:ext cx="6493079" cy="2308324"/>
+            <a:off x="578840" y="536895"/>
+            <a:ext cx="1367406" cy="369332"/>
           </a:xfrm>
           <a:prstGeom prst="rect">
             <a:avLst/>
@@ -4590,38 +4468,61 @@
           <a:p>
             <a:r>
               <a:rPr lang="en-US" dirty="0"/>
-              <a:t>Delete the spa app </a:t>
+              <a:t>Track clicks</a:t>
+            </a:r>
+          </a:p>
+        </p:txBody>
+      </p:sp>
+      <p:sp>
+        <p:nvSpPr>
+          <p:cNvPr id="5" name="TextBox 4">
+            <a:extLst>
+              <a:ext uri="{FF2B5EF4-FFF2-40B4-BE49-F238E27FC236}">
+                <a16:creationId xmlns:a16="http://schemas.microsoft.com/office/drawing/2014/main" id="{F65ACCC9-27CC-42E7-B619-A4C1A4B2F04C}"/>
+              </a:ext>
+            </a:extLst>
+          </p:cNvPr>
+          <p:cNvSpPr txBox="1"/>
+          <p:nvPr/>
+        </p:nvSpPr>
+        <p:spPr>
+          <a:xfrm>
+            <a:off x="2776756" y="788565"/>
+            <a:ext cx="9798516" cy="5355312"/>
+          </a:xfrm>
+          <a:prstGeom prst="rect">
+            <a:avLst/>
+          </a:prstGeom>
+          <a:noFill/>
+        </p:spPr>
+        <p:txBody>
+          <a:bodyPr wrap="none" rtlCol="0">
+            <a:spAutoFit/>
+          </a:bodyPr>
+          <a:lstStyle/>
+          <a:p>
+            <a:pPr marL="285750" indent="-285750">
+              <a:buFont typeface="Arial" panose="020B0604020202020204" pitchFamily="34" charset="0"/>
+              <a:buChar char="•"/>
+            </a:pPr>
+            <a:endParaRPr lang="en-US" dirty="0"/>
+          </a:p>
+          <a:p>
+            <a:pPr marL="285750" indent="-285750">
+              <a:buFont typeface="Arial" panose="020B0604020202020204" pitchFamily="34" charset="0"/>
+              <a:buChar char="•"/>
+            </a:pPr>
+            <a:r>
+              <a:rPr lang="en-US" dirty="0"/>
+              <a:t>Add </a:t>
             </a:r>
             <a:r>
               <a:rPr lang="en-US" dirty="0" err="1"/>
-              <a:t>src</a:t>
-            </a:r>
-            <a:r>
-              <a:rPr lang="en-US" dirty="0"/>
-              <a:t> folder under Client App and replace with tour of heroes source (from tutorial) so we have some functionality – with the in memory service implementation</a:t>
-            </a:r>
-          </a:p>
-          <a:p>
-            <a:endParaRPr lang="en-US" dirty="0"/>
-          </a:p>
-          <a:p>
-            <a:r>
-              <a:rPr lang="en-US" dirty="0" err="1"/>
-              <a:t>Npm</a:t>
-            </a:r>
-            <a:r>
-              <a:rPr lang="en-US" dirty="0"/>
-              <a:t> install</a:t>
-            </a:r>
-          </a:p>
-          <a:p>
-            <a:r>
-              <a:rPr lang="en-US" dirty="0" err="1"/>
-              <a:t>npm</a:t>
-            </a:r>
-            <a:r>
-              <a:rPr lang="en-US" dirty="0"/>
-              <a:t> install angular-in-memory-web-</a:t>
+              <a:t>clicktrack</a:t>
+            </a:r>
+            <a:r>
+              <a:rPr lang="en-US" dirty="0"/>
+              <a:t> controller to </a:t>
             </a:r>
             <a:r>
               <a:rPr lang="en-US" dirty="0" err="1"/>
@@ -4629,24 +4530,200 @@
             </a:r>
             <a:r>
               <a:rPr lang="en-US" dirty="0"/>
-              <a:t> –save</a:t>
-            </a:r>
-          </a:p>
-          <a:p>
-            <a:r>
-              <a:rPr lang="en-US" dirty="0"/>
               <a:t> </a:t>
             </a:r>
+          </a:p>
+          <a:p>
+            <a:endParaRPr lang="en-US" dirty="0"/>
+          </a:p>
+          <a:p>
+            <a:pPr marL="285750" indent="-285750">
+              <a:buFont typeface="Arial" panose="020B0604020202020204" pitchFamily="34" charset="0"/>
+              <a:buChar char="•"/>
+            </a:pPr>
+            <a:r>
+              <a:rPr lang="en-US" dirty="0"/>
+              <a:t>ng generate service </a:t>
+            </a:r>
             <a:r>
               <a:rPr lang="en-US" dirty="0" err="1"/>
-              <a:t>npm</a:t>
-            </a:r>
-            <a:r>
-              <a:rPr lang="en-US" dirty="0"/>
-              <a:t> audit fix</a:t>
-            </a:r>
-          </a:p>
-          <a:p>
+              <a:t>clicktrack</a:t>
+            </a:r>
+            <a:endParaRPr lang="en-US" dirty="0"/>
+          </a:p>
+          <a:p>
+            <a:pPr marL="285750" indent="-285750">
+              <a:buFont typeface="Arial" panose="020B0604020202020204" pitchFamily="34" charset="0"/>
+              <a:buChar char="•"/>
+            </a:pPr>
+            <a:endParaRPr lang="en-US" dirty="0"/>
+          </a:p>
+          <a:p>
+            <a:pPr marL="285750" indent="-285750">
+              <a:buFont typeface="Arial" panose="020B0604020202020204" pitchFamily="34" charset="0"/>
+              <a:buChar char="•"/>
+            </a:pPr>
+            <a:r>
+              <a:rPr lang="en-US" dirty="0"/>
+              <a:t>Add </a:t>
+            </a:r>
+            <a:r>
+              <a:rPr lang="en-US" dirty="0" err="1"/>
+              <a:t>trackeditem</a:t>
+            </a:r>
+            <a:r>
+              <a:rPr lang="en-US" dirty="0"/>
+              <a:t> model</a:t>
+            </a:r>
+          </a:p>
+          <a:p>
+            <a:pPr marL="285750" indent="-285750">
+              <a:buFont typeface="Arial" panose="020B0604020202020204" pitchFamily="34" charset="0"/>
+              <a:buChar char="•"/>
+            </a:pPr>
+            <a:r>
+              <a:rPr lang="en-US" dirty="0"/>
+              <a:t>Inject the service in the constructor of dashboard</a:t>
+            </a:r>
+          </a:p>
+          <a:p>
+            <a:pPr marL="285750" indent="-285750">
+              <a:buFont typeface="Arial" panose="020B0604020202020204" pitchFamily="34" charset="0"/>
+              <a:buChar char="•"/>
+            </a:pPr>
+            <a:r>
+              <a:rPr lang="en-US" dirty="0"/>
+              <a:t>Add click method to </a:t>
+            </a:r>
+            <a:r>
+              <a:rPr lang="en-US" dirty="0" err="1"/>
+              <a:t>dashboard.components.ts</a:t>
+            </a:r>
+            <a:endParaRPr lang="en-US" dirty="0"/>
+          </a:p>
+          <a:p>
+            <a:pPr marL="285750" indent="-285750">
+              <a:buFont typeface="Arial" panose="020B0604020202020204" pitchFamily="34" charset="0"/>
+              <a:buChar char="•"/>
+            </a:pPr>
+            <a:r>
+              <a:rPr lang="en-US" dirty="0"/>
+              <a:t>Add click even to the </a:t>
+            </a:r>
+          </a:p>
+          <a:p>
+            <a:pPr marL="285750" indent="-285750">
+              <a:buFont typeface="Arial" panose="020B0604020202020204" pitchFamily="34" charset="0"/>
+              <a:buChar char="•"/>
+            </a:pPr>
+            <a:r>
+              <a:rPr lang="en-US" dirty="0"/>
+              <a:t>&lt;a *</a:t>
+            </a:r>
+            <a:r>
+              <a:rPr lang="en-US" dirty="0" err="1"/>
+              <a:t>ngFor</a:t>
+            </a:r>
+            <a:r>
+              <a:rPr lang="en-US" dirty="0"/>
+              <a:t>="let hero of heroes" class="col-1-4" (click)="click(hero)" </a:t>
+            </a:r>
+            <a:r>
+              <a:rPr lang="en-US" dirty="0" err="1"/>
+              <a:t>routerLink</a:t>
+            </a:r>
+            <a:r>
+              <a:rPr lang="en-US" dirty="0"/>
+              <a:t>="/detail/{{hero.id}}"&gt;</a:t>
+            </a:r>
+          </a:p>
+          <a:p>
+            <a:pPr marL="285750" indent="-285750">
+              <a:buFont typeface="Arial" panose="020B0604020202020204" pitchFamily="34" charset="0"/>
+              <a:buChar char="•"/>
+            </a:pPr>
+            <a:endParaRPr lang="en-US" dirty="0"/>
+          </a:p>
+          <a:p>
+            <a:pPr marL="285750" indent="-285750">
+              <a:buFont typeface="Arial" panose="020B0604020202020204" pitchFamily="34" charset="0"/>
+              <a:buChar char="•"/>
+            </a:pPr>
+            <a:r>
+              <a:rPr lang="en-US" dirty="0"/>
+              <a:t>Repeat for heroes</a:t>
+            </a:r>
+          </a:p>
+          <a:p>
+            <a:pPr marL="285750" indent="-285750">
+              <a:buFont typeface="Arial" panose="020B0604020202020204" pitchFamily="34" charset="0"/>
+              <a:buChar char="•"/>
+            </a:pPr>
+            <a:endParaRPr lang="en-US" dirty="0"/>
+          </a:p>
+          <a:p>
+            <a:pPr marL="285750" indent="-285750">
+              <a:buFont typeface="Arial" panose="020B0604020202020204" pitchFamily="34" charset="0"/>
+              <a:buChar char="•"/>
+            </a:pPr>
+            <a:r>
+              <a:rPr lang="en-US" dirty="0"/>
+              <a:t>Open </a:t>
+            </a:r>
+            <a:r>
+              <a:rPr lang="en-US" dirty="0" err="1"/>
+              <a:t>kibana</a:t>
+            </a:r>
+            <a:r>
+              <a:rPr lang="en-US" dirty="0"/>
+              <a:t> </a:t>
+            </a:r>
+          </a:p>
+          <a:p>
+            <a:pPr marL="742950" lvl="1" indent="-285750">
+              <a:buFont typeface="Arial" panose="020B0604020202020204" pitchFamily="34" charset="0"/>
+              <a:buChar char="•"/>
+            </a:pPr>
+            <a:r>
+              <a:rPr lang="en-US" dirty="0"/>
+              <a:t>Run app - click</a:t>
+            </a:r>
+          </a:p>
+          <a:p>
+            <a:pPr marL="742950" lvl="1" indent="-285750">
+              <a:buFont typeface="Arial" panose="020B0604020202020204" pitchFamily="34" charset="0"/>
+              <a:buChar char="•"/>
+            </a:pPr>
+            <a:r>
+              <a:rPr lang="en-US" dirty="0"/>
+              <a:t>add index pattern</a:t>
+            </a:r>
+          </a:p>
+          <a:p>
+            <a:pPr marL="742950" lvl="1" indent="-285750">
+              <a:buFont typeface="Arial" panose="020B0604020202020204" pitchFamily="34" charset="0"/>
+              <a:buChar char="•"/>
+            </a:pPr>
+            <a:r>
+              <a:rPr lang="en-US" dirty="0"/>
+              <a:t>Time base dashboard</a:t>
+            </a:r>
+          </a:p>
+          <a:p>
+            <a:pPr marL="742950" lvl="1" indent="-285750">
+              <a:buFont typeface="Arial" panose="020B0604020202020204" pitchFamily="34" charset="0"/>
+              <a:buChar char="•"/>
+            </a:pPr>
+            <a:r>
+              <a:rPr lang="en-US" dirty="0"/>
+              <a:t>Click some more</a:t>
+            </a:r>
+          </a:p>
+          <a:p>
+            <a:pPr marL="742950" lvl="1" indent="-285750">
+              <a:buFont typeface="Arial" panose="020B0604020202020204" pitchFamily="34" charset="0"/>
+              <a:buChar char="•"/>
+            </a:pPr>
             <a:endParaRPr lang="en-US" dirty="0"/>
           </a:p>
         </p:txBody>
@@ -4654,7 +4731,7 @@
     </p:spTree>
     <p:extLst>
       <p:ext uri="{BB962C8B-B14F-4D97-AF65-F5344CB8AC3E}">
-        <p14:creationId xmlns:p14="http://schemas.microsoft.com/office/powerpoint/2010/main" val="1047589209"/>
+        <p14:creationId xmlns:p14="http://schemas.microsoft.com/office/powerpoint/2010/main" val="4004732083"/>
       </p:ext>
     </p:extLst>
   </p:cSld>
@@ -4683,81 +4760,68 @@
       </p:grpSpPr>
       <p:sp>
         <p:nvSpPr>
-          <p:cNvPr id="4" name="TextBox 3">
-            <a:extLst>
-              <a:ext uri="{FF2B5EF4-FFF2-40B4-BE49-F238E27FC236}">
-                <a16:creationId xmlns:a16="http://schemas.microsoft.com/office/drawing/2014/main" id="{7B06F338-C4AD-447A-9DC5-4BB7527BDB24}"/>
-              </a:ext>
-            </a:extLst>
-          </p:cNvPr>
-          <p:cNvSpPr txBox="1"/>
-          <p:nvPr/>
-        </p:nvSpPr>
-        <p:spPr>
-          <a:xfrm>
-            <a:off x="578840" y="536895"/>
-            <a:ext cx="1367406" cy="369332"/>
-          </a:xfrm>
-          <a:prstGeom prst="rect">
-            <a:avLst/>
-          </a:prstGeom>
-          <a:noFill/>
-        </p:spPr>
-        <p:txBody>
-          <a:bodyPr wrap="square" rtlCol="0">
-            <a:spAutoFit/>
-          </a:bodyPr>
-          <a:lstStyle/>
-          <a:p>
-            <a:r>
-              <a:rPr lang="en-US" dirty="0"/>
-              <a:t>Track clicks</a:t>
-            </a:r>
-          </a:p>
-        </p:txBody>
-      </p:sp>
-      <p:sp>
-        <p:nvSpPr>
-          <p:cNvPr id="5" name="TextBox 4">
-            <a:extLst>
-              <a:ext uri="{FF2B5EF4-FFF2-40B4-BE49-F238E27FC236}">
-                <a16:creationId xmlns:a16="http://schemas.microsoft.com/office/drawing/2014/main" id="{F65ACCC9-27CC-42E7-B619-A4C1A4B2F04C}"/>
-              </a:ext>
-            </a:extLst>
-          </p:cNvPr>
-          <p:cNvSpPr txBox="1"/>
-          <p:nvPr/>
-        </p:nvSpPr>
-        <p:spPr>
-          <a:xfrm>
-            <a:off x="2776756" y="788565"/>
-            <a:ext cx="9798516" cy="5355312"/>
-          </a:xfrm>
-          <a:prstGeom prst="rect">
-            <a:avLst/>
-          </a:prstGeom>
-          <a:noFill/>
-        </p:spPr>
-        <p:txBody>
-          <a:bodyPr wrap="none" rtlCol="0">
-            <a:spAutoFit/>
-          </a:bodyPr>
-          <a:lstStyle/>
-          <a:p>
-            <a:pPr marL="285750" indent="-285750">
-              <a:buFont typeface="Arial" panose="020B0604020202020204" pitchFamily="34" charset="0"/>
-              <a:buChar char="•"/>
-            </a:pPr>
-            <a:endParaRPr lang="en-US" dirty="0"/>
-          </a:p>
-          <a:p>
-            <a:pPr marL="285750" indent="-285750">
-              <a:buFont typeface="Arial" panose="020B0604020202020204" pitchFamily="34" charset="0"/>
-              <a:buChar char="•"/>
-            </a:pPr>
+          <p:cNvPr id="2" name="Title 1">
+            <a:extLst>
+              <a:ext uri="{FF2B5EF4-FFF2-40B4-BE49-F238E27FC236}">
+                <a16:creationId xmlns:a16="http://schemas.microsoft.com/office/drawing/2014/main" id="{0F9E919B-8E9B-4A1C-BC5B-9F93DF1F3A0F}"/>
+              </a:ext>
+            </a:extLst>
+          </p:cNvPr>
+          <p:cNvSpPr>
+            <a:spLocks noGrp="1"/>
+          </p:cNvSpPr>
+          <p:nvPr>
+            <p:ph type="title"/>
+          </p:nvPr>
+        </p:nvSpPr>
+        <p:spPr/>
+        <p:txBody>
+          <a:bodyPr/>
+          <a:lstStyle/>
+          <a:p>
+            <a:r>
+              <a:rPr lang="en-US" dirty="0" err="1"/>
+              <a:t>TimedHostedEnrichment</a:t>
+            </a:r>
+            <a:r>
+              <a:rPr lang="en-US" dirty="0"/>
+              <a:t> service</a:t>
+            </a:r>
+          </a:p>
+        </p:txBody>
+      </p:sp>
+      <p:sp>
+        <p:nvSpPr>
+          <p:cNvPr id="3" name="Content Placeholder 2">
+            <a:extLst>
+              <a:ext uri="{FF2B5EF4-FFF2-40B4-BE49-F238E27FC236}">
+                <a16:creationId xmlns:a16="http://schemas.microsoft.com/office/drawing/2014/main" id="{C76C0AAB-1860-434A-B727-0951F6564298}"/>
+              </a:ext>
+            </a:extLst>
+          </p:cNvPr>
+          <p:cNvSpPr>
+            <a:spLocks noGrp="1"/>
+          </p:cNvSpPr>
+          <p:nvPr>
+            <p:ph idx="1"/>
+          </p:nvPr>
+        </p:nvSpPr>
+        <p:spPr/>
+        <p:txBody>
+          <a:bodyPr/>
+          <a:lstStyle/>
+          <a:p>
             <a:r>
               <a:rPr lang="en-US" dirty="0"/>
               <a:t>Add </a:t>
+            </a:r>
+            <a:r>
+              <a:rPr lang="en-US" dirty="0" err="1"/>
+              <a:t>TimeHostedEnrichmentService</a:t>
+            </a:r>
+            <a:r>
+              <a:rPr lang="en-US" dirty="0"/>
+              <a:t> to aggregate and enrich </a:t>
             </a:r>
             <a:r>
               <a:rPr lang="en-US" dirty="0" err="1"/>
@@ -4765,208 +4829,74 @@
             </a:r>
             <a:r>
               <a:rPr lang="en-US" dirty="0"/>
-              <a:t> controller to </a:t>
+              <a:t> information to alter the search results based on user interaction</a:t>
+            </a:r>
+          </a:p>
+          <a:p>
+            <a:r>
+              <a:rPr lang="en-US" dirty="0"/>
+              <a:t>Register </a:t>
             </a:r>
             <a:r>
               <a:rPr lang="en-US" dirty="0" err="1"/>
-              <a:t>api</a:t>
-            </a:r>
-            <a:r>
-              <a:rPr lang="en-US" dirty="0"/>
-              <a:t> </a:t>
-            </a:r>
-          </a:p>
-          <a:p>
+              <a:t>TimeHostedEnrichement</a:t>
+            </a:r>
+            <a:r>
+              <a:rPr lang="en-US" dirty="0"/>
+              <a:t> service</a:t>
+            </a:r>
+          </a:p>
+          <a:p>
+            <a:pPr lvl="1"/>
+            <a:r>
+              <a:rPr lang="en-US" dirty="0" err="1"/>
+              <a:t>services.AddHostedService</a:t>
+            </a:r>
+            <a:r>
+              <a:rPr lang="en-US" dirty="0"/>
+              <a:t>&lt;</a:t>
+            </a:r>
+            <a:r>
+              <a:rPr lang="en-US" dirty="0" err="1"/>
+              <a:t>TimedHostedEnrichementService</a:t>
+            </a:r>
+            <a:r>
+              <a:rPr lang="en-US" dirty="0"/>
+              <a:t>&gt;();</a:t>
+            </a:r>
+          </a:p>
+          <a:p>
+            <a:r>
+              <a:rPr lang="en-US" dirty="0"/>
+              <a:t>Start app.. View logs</a:t>
+            </a:r>
+          </a:p>
+          <a:p>
+            <a:r>
+              <a:rPr lang="en-US" dirty="0"/>
+              <a:t>Validate</a:t>
+            </a:r>
+          </a:p>
+          <a:p>
+            <a:r>
+              <a:rPr lang="en-US" dirty="0"/>
+              <a:t>Add sorting to the get query in </a:t>
+            </a:r>
+            <a:r>
+              <a:rPr lang="en-US"/>
+              <a:t>the controller</a:t>
+            </a:r>
             <a:endParaRPr lang="en-US" dirty="0"/>
           </a:p>
           <a:p>
-            <a:pPr marL="285750" indent="-285750">
-              <a:buFont typeface="Arial" panose="020B0604020202020204" pitchFamily="34" charset="0"/>
-              <a:buChar char="•"/>
-            </a:pPr>
-            <a:r>
-              <a:rPr lang="en-US" dirty="0"/>
-              <a:t>ng generate service </a:t>
-            </a:r>
-            <a:r>
-              <a:rPr lang="en-US" dirty="0" err="1"/>
-              <a:t>clicktrack</a:t>
-            </a:r>
+            <a:pPr lvl="1"/>
             <a:endParaRPr lang="en-US" dirty="0"/>
           </a:p>
           <a:p>
-            <a:pPr marL="285750" indent="-285750">
-              <a:buFont typeface="Arial" panose="020B0604020202020204" pitchFamily="34" charset="0"/>
-              <a:buChar char="•"/>
-            </a:pPr>
+            <a:pPr lvl="1"/>
             <a:endParaRPr lang="en-US" dirty="0"/>
           </a:p>
           <a:p>
-            <a:pPr marL="285750" indent="-285750">
-              <a:buFont typeface="Arial" panose="020B0604020202020204" pitchFamily="34" charset="0"/>
-              <a:buChar char="•"/>
-            </a:pPr>
-            <a:r>
-              <a:rPr lang="en-US" dirty="0"/>
-              <a:t>Add </a:t>
-            </a:r>
-            <a:r>
-              <a:rPr lang="en-US" dirty="0" err="1"/>
-              <a:t>trackeditem</a:t>
-            </a:r>
-            <a:r>
-              <a:rPr lang="en-US" dirty="0"/>
-              <a:t> model</a:t>
-            </a:r>
-          </a:p>
-          <a:p>
-            <a:pPr marL="285750" indent="-285750">
-              <a:buFont typeface="Arial" panose="020B0604020202020204" pitchFamily="34" charset="0"/>
-              <a:buChar char="•"/>
-            </a:pPr>
-            <a:r>
-              <a:rPr lang="en-US" dirty="0"/>
-              <a:t>Inject the service in the constructor of dashboard</a:t>
-            </a:r>
-          </a:p>
-          <a:p>
-            <a:pPr marL="285750" indent="-285750">
-              <a:buFont typeface="Arial" panose="020B0604020202020204" pitchFamily="34" charset="0"/>
-              <a:buChar char="•"/>
-            </a:pPr>
-            <a:r>
-              <a:rPr lang="en-US" dirty="0"/>
-              <a:t>Add click method to </a:t>
-            </a:r>
-            <a:r>
-              <a:rPr lang="en-US" dirty="0" err="1"/>
-              <a:t>dashboard.components.ts</a:t>
-            </a:r>
-            <a:endParaRPr lang="en-US" dirty="0"/>
-          </a:p>
-          <a:p>
-            <a:pPr marL="285750" indent="-285750">
-              <a:buFont typeface="Arial" panose="020B0604020202020204" pitchFamily="34" charset="0"/>
-              <a:buChar char="•"/>
-            </a:pPr>
-            <a:r>
-              <a:rPr lang="en-US" dirty="0"/>
-              <a:t>Add click even to the </a:t>
-            </a:r>
-          </a:p>
-          <a:p>
-            <a:pPr marL="285750" indent="-285750">
-              <a:buFont typeface="Arial" panose="020B0604020202020204" pitchFamily="34" charset="0"/>
-              <a:buChar char="•"/>
-            </a:pPr>
-            <a:r>
-              <a:rPr lang="en-US" dirty="0"/>
-              <a:t>&lt;a *</a:t>
-            </a:r>
-            <a:r>
-              <a:rPr lang="en-US" dirty="0" err="1"/>
-              <a:t>ngFor</a:t>
-            </a:r>
-            <a:r>
-              <a:rPr lang="en-US" dirty="0"/>
-              <a:t>="let hero of heroes" class="col-1-4" (click)="click(hero)" </a:t>
-            </a:r>
-            <a:r>
-              <a:rPr lang="en-US" dirty="0" err="1"/>
-              <a:t>routerLink</a:t>
-            </a:r>
-            <a:r>
-              <a:rPr lang="en-US" dirty="0"/>
-              <a:t>="/detail/{{hero.id}}"&gt;</a:t>
-            </a:r>
-          </a:p>
-          <a:p>
-            <a:pPr marL="285750" indent="-285750">
-              <a:buFont typeface="Arial" panose="020B0604020202020204" pitchFamily="34" charset="0"/>
-              <a:buChar char="•"/>
-            </a:pPr>
-            <a:endParaRPr lang="en-US" dirty="0"/>
-          </a:p>
-          <a:p>
-            <a:pPr marL="285750" indent="-285750">
-              <a:buFont typeface="Arial" panose="020B0604020202020204" pitchFamily="34" charset="0"/>
-              <a:buChar char="•"/>
-            </a:pPr>
-            <a:r>
-              <a:rPr lang="en-US" dirty="0"/>
-              <a:t>Repeat for heroes</a:t>
-            </a:r>
-          </a:p>
-          <a:p>
-            <a:pPr marL="285750" indent="-285750">
-              <a:buFont typeface="Arial" panose="020B0604020202020204" pitchFamily="34" charset="0"/>
-              <a:buChar char="•"/>
-            </a:pPr>
-            <a:endParaRPr lang="en-US" dirty="0"/>
-          </a:p>
-          <a:p>
-            <a:pPr marL="285750" indent="-285750">
-              <a:buFont typeface="Arial" panose="020B0604020202020204" pitchFamily="34" charset="0"/>
-              <a:buChar char="•"/>
-            </a:pPr>
-            <a:r>
-              <a:rPr lang="en-US" dirty="0"/>
-              <a:t>Open </a:t>
-            </a:r>
-            <a:r>
-              <a:rPr lang="en-US" dirty="0" err="1"/>
-              <a:t>kibana</a:t>
-            </a:r>
-            <a:r>
-              <a:rPr lang="en-US" dirty="0"/>
-              <a:t> </a:t>
-            </a:r>
-          </a:p>
-          <a:p>
-            <a:pPr marL="742950" lvl="1" indent="-285750">
-              <a:buFont typeface="Arial" panose="020B0604020202020204" pitchFamily="34" charset="0"/>
-              <a:buChar char="•"/>
-            </a:pPr>
-            <a:r>
-              <a:rPr lang="en-US" dirty="0"/>
-              <a:t>Run app - click</a:t>
-            </a:r>
-          </a:p>
-          <a:p>
-            <a:pPr marL="742950" lvl="1" indent="-285750">
-              <a:buFont typeface="Arial" panose="020B0604020202020204" pitchFamily="34" charset="0"/>
-              <a:buChar char="•"/>
-            </a:pPr>
-            <a:r>
-              <a:rPr lang="en-US" dirty="0"/>
-              <a:t>add index pattern</a:t>
-            </a:r>
-          </a:p>
-          <a:p>
-            <a:pPr marL="742950" lvl="1" indent="-285750">
-              <a:buFont typeface="Arial" panose="020B0604020202020204" pitchFamily="34" charset="0"/>
-              <a:buChar char="•"/>
-            </a:pPr>
-            <a:r>
-              <a:rPr lang="en-US" dirty="0"/>
-              <a:t>Time base dashboard</a:t>
-            </a:r>
-          </a:p>
-          <a:p>
-            <a:pPr marL="742950" lvl="1" indent="-285750">
-              <a:buFont typeface="Arial" panose="020B0604020202020204" pitchFamily="34" charset="0"/>
-              <a:buChar char="•"/>
-            </a:pPr>
-            <a:r>
-              <a:rPr lang="en-US" dirty="0"/>
-              <a:t>Click some more</a:t>
-            </a:r>
-          </a:p>
-          <a:p>
-            <a:pPr marL="742950" lvl="1" indent="-285750">
-              <a:buFont typeface="Arial" panose="020B0604020202020204" pitchFamily="34" charset="0"/>
-              <a:buChar char="•"/>
-            </a:pPr>
             <a:endParaRPr lang="en-US" dirty="0"/>
           </a:p>
         </p:txBody>
@@ -4974,7 +4904,7 @@
     </p:spTree>
     <p:extLst>
       <p:ext uri="{BB962C8B-B14F-4D97-AF65-F5344CB8AC3E}">
-        <p14:creationId xmlns:p14="http://schemas.microsoft.com/office/powerpoint/2010/main" val="4004732083"/>
+        <p14:creationId xmlns:p14="http://schemas.microsoft.com/office/powerpoint/2010/main" val="2229548722"/>
       </p:ext>
     </p:extLst>
   </p:cSld>

</xml_diff>